<commit_message>
Changed starting index from 1 to 0
</commit_message>
<xml_diff>
--- a/neural_network.pptx
+++ b/neural_network.pptx
@@ -288,7 +288,7 @@
           <a:p>
             <a:fld id="{FB30EDBD-1C2D-4C1E-B459-B60219FAB484}" type="datetimeFigureOut">
               <a:rPr lang="ko-KR" altLang="en-US" smtClean="0"/>
-              <a:t>2018-09-15</a:t>
+              <a:t>2018-09-16</a:t>
             </a:fld>
             <a:endParaRPr lang="ko-KR" altLang="en-US"/>
           </a:p>
@@ -453,7 +453,7 @@
           <a:p>
             <a:fld id="{FB30EDBD-1C2D-4C1E-B459-B60219FAB484}" type="datetimeFigureOut">
               <a:rPr lang="ko-KR" altLang="en-US" smtClean="0"/>
-              <a:t>2018-09-15</a:t>
+              <a:t>2018-09-16</a:t>
             </a:fld>
             <a:endParaRPr lang="ko-KR" altLang="en-US"/>
           </a:p>
@@ -628,7 +628,7 @@
           <a:p>
             <a:fld id="{FB30EDBD-1C2D-4C1E-B459-B60219FAB484}" type="datetimeFigureOut">
               <a:rPr lang="ko-KR" altLang="en-US" smtClean="0"/>
-              <a:t>2018-09-15</a:t>
+              <a:t>2018-09-16</a:t>
             </a:fld>
             <a:endParaRPr lang="ko-KR" altLang="en-US"/>
           </a:p>
@@ -793,7 +793,7 @@
           <a:p>
             <a:fld id="{FB30EDBD-1C2D-4C1E-B459-B60219FAB484}" type="datetimeFigureOut">
               <a:rPr lang="ko-KR" altLang="en-US" smtClean="0"/>
-              <a:t>2018-09-15</a:t>
+              <a:t>2018-09-16</a:t>
             </a:fld>
             <a:endParaRPr lang="ko-KR" altLang="en-US"/>
           </a:p>
@@ -1034,7 +1034,7 @@
           <a:p>
             <a:fld id="{FB30EDBD-1C2D-4C1E-B459-B60219FAB484}" type="datetimeFigureOut">
               <a:rPr lang="ko-KR" altLang="en-US" smtClean="0"/>
-              <a:t>2018-09-15</a:t>
+              <a:t>2018-09-16</a:t>
             </a:fld>
             <a:endParaRPr lang="ko-KR" altLang="en-US"/>
           </a:p>
@@ -1317,7 +1317,7 @@
           <a:p>
             <a:fld id="{FB30EDBD-1C2D-4C1E-B459-B60219FAB484}" type="datetimeFigureOut">
               <a:rPr lang="ko-KR" altLang="en-US" smtClean="0"/>
-              <a:t>2018-09-15</a:t>
+              <a:t>2018-09-16</a:t>
             </a:fld>
             <a:endParaRPr lang="ko-KR" altLang="en-US"/>
           </a:p>
@@ -1734,7 +1734,7 @@
           <a:p>
             <a:fld id="{FB30EDBD-1C2D-4C1E-B459-B60219FAB484}" type="datetimeFigureOut">
               <a:rPr lang="ko-KR" altLang="en-US" smtClean="0"/>
-              <a:t>2018-09-15</a:t>
+              <a:t>2018-09-16</a:t>
             </a:fld>
             <a:endParaRPr lang="ko-KR" altLang="en-US"/>
           </a:p>
@@ -1847,7 +1847,7 @@
           <a:p>
             <a:fld id="{FB30EDBD-1C2D-4C1E-B459-B60219FAB484}" type="datetimeFigureOut">
               <a:rPr lang="ko-KR" altLang="en-US" smtClean="0"/>
-              <a:t>2018-09-15</a:t>
+              <a:t>2018-09-16</a:t>
             </a:fld>
             <a:endParaRPr lang="ko-KR" altLang="en-US"/>
           </a:p>
@@ -1937,7 +1937,7 @@
           <a:p>
             <a:fld id="{FB30EDBD-1C2D-4C1E-B459-B60219FAB484}" type="datetimeFigureOut">
               <a:rPr lang="ko-KR" altLang="en-US" smtClean="0"/>
-              <a:t>2018-09-15</a:t>
+              <a:t>2018-09-16</a:t>
             </a:fld>
             <a:endParaRPr lang="ko-KR" altLang="en-US"/>
           </a:p>
@@ -2209,7 +2209,7 @@
           <a:p>
             <a:fld id="{FB30EDBD-1C2D-4C1E-B459-B60219FAB484}" type="datetimeFigureOut">
               <a:rPr lang="ko-KR" altLang="en-US" smtClean="0"/>
-              <a:t>2018-09-15</a:t>
+              <a:t>2018-09-16</a:t>
             </a:fld>
             <a:endParaRPr lang="ko-KR" altLang="en-US"/>
           </a:p>
@@ -2457,7 +2457,7 @@
           <a:p>
             <a:fld id="{FB30EDBD-1C2D-4C1E-B459-B60219FAB484}" type="datetimeFigureOut">
               <a:rPr lang="ko-KR" altLang="en-US" smtClean="0"/>
-              <a:t>2018-09-15</a:t>
+              <a:t>2018-09-16</a:t>
             </a:fld>
             <a:endParaRPr lang="ko-KR" altLang="en-US"/>
           </a:p>
@@ -2665,7 +2665,7 @@
           <a:p>
             <a:fld id="{FB30EDBD-1C2D-4C1E-B459-B60219FAB484}" type="datetimeFigureOut">
               <a:rPr lang="ko-KR" altLang="en-US" smtClean="0"/>
-              <a:t>2018-09-15</a:t>
+              <a:t>2018-09-16</a:t>
             </a:fld>
             <a:endParaRPr lang="ko-KR" altLang="en-US"/>
           </a:p>
@@ -3794,7 +3794,7 @@
             <p:spPr>
               <a:xfrm>
                 <a:off x="2332816" y="2416242"/>
-                <a:ext cx="464999" cy="385362"/>
+                <a:ext cx="477246" cy="374205"/>
               </a:xfrm>
               <a:prstGeom prst="rect">
                 <a:avLst/>
@@ -3807,6 +3807,7 @@
               </a:bodyPr>
               <a:lstStyle/>
               <a:p>
+                <a:pPr/>
                 <a14:m>
                   <m:oMathPara xmlns:m="http://schemas.openxmlformats.org/officeDocument/2006/math">
                     <m:oMathParaPr>
@@ -3816,7 +3817,9 @@
                       <m:sSubSup>
                         <m:sSubSupPr>
                           <m:ctrlPr>
-                            <a:rPr lang="ko-KR" altLang="ko-KR" i="1" smtClean="0"/>
+                            <a:rPr lang="ko-KR" altLang="ko-KR" i="1" smtClean="0">
+                              <a:latin typeface="Cambria Math"/>
+                            </a:rPr>
                           </m:ctrlPr>
                         </m:sSubSupPr>
                         <m:e>
@@ -3824,7 +3827,9 @@
                             <m:rPr>
                               <m:sty m:val="p"/>
                             </m:rPr>
-                            <a:rPr lang="en-US" altLang="ko-KR"/>
+                            <a:rPr lang="en-US" altLang="ko-KR">
+                              <a:latin typeface="Cambria Math"/>
+                            </a:rPr>
                             <m:t>Z</m:t>
                           </m:r>
                         </m:e>
@@ -3841,7 +3846,7 @@
                             <a:rPr lang="en-US" altLang="ko-KR" b="0" i="1" smtClean="0">
                               <a:latin typeface="Cambria Math"/>
                             </a:rPr>
-                            <m:t>1</m:t>
+                            <m:t>0</m:t>
                           </m:r>
                         </m:sup>
                       </m:sSubSup>
@@ -3865,7 +3870,7 @@
             <p:spPr>
               <a:xfrm>
                 <a:off x="2332816" y="2416242"/>
-                <a:ext cx="464999" cy="385362"/>
+                <a:ext cx="477246" cy="374205"/>
               </a:xfrm>
               <a:prstGeom prst="rect">
                 <a:avLst/>
@@ -3873,7 +3878,7 @@
               <a:blipFill rotWithShape="1">
                 <a:blip r:embed="rId2"/>
                 <a:stretch>
-                  <a:fillRect/>
+                  <a:fillRect b="-1613"/>
                 </a:stretch>
               </a:blipFill>
             </p:spPr>
@@ -6173,7 +6178,7 @@
             <p:spPr>
               <a:xfrm>
                 <a:off x="2301396" y="791496"/>
-                <a:ext cx="464999" cy="415050"/>
+                <a:ext cx="477246" cy="417358"/>
               </a:xfrm>
               <a:prstGeom prst="rect">
                 <a:avLst/>
@@ -6186,6 +6191,7 @@
               </a:bodyPr>
               <a:lstStyle/>
               <a:p>
+                <a:pPr/>
                 <a14:m>
                   <m:oMathPara xmlns:m="http://schemas.openxmlformats.org/officeDocument/2006/math">
                     <m:oMathParaPr>
@@ -6195,7 +6201,9 @@
                       <m:sSubSup>
                         <m:sSubSupPr>
                           <m:ctrlPr>
-                            <a:rPr lang="ko-KR" altLang="ko-KR" i="1" smtClean="0"/>
+                            <a:rPr lang="ko-KR" altLang="ko-KR" i="1" smtClean="0">
+                              <a:latin typeface="Cambria Math"/>
+                            </a:rPr>
                           </m:ctrlPr>
                         </m:sSubSupPr>
                         <m:e>
@@ -6203,7 +6211,9 @@
                             <m:rPr>
                               <m:sty m:val="p"/>
                             </m:rPr>
-                            <a:rPr lang="en-US" altLang="ko-KR"/>
+                            <a:rPr lang="en-US" altLang="ko-KR">
+                              <a:latin typeface="Cambria Math"/>
+                            </a:rPr>
                             <m:t>Z</m:t>
                           </m:r>
                         </m:e>
@@ -6220,7 +6230,7 @@
                             <a:rPr lang="en-US" altLang="ko-KR" b="0" i="1" smtClean="0">
                               <a:latin typeface="Cambria Math"/>
                             </a:rPr>
-                            <m:t>1</m:t>
+                            <m:t>0</m:t>
                           </m:r>
                         </m:sup>
                       </m:sSubSup>
@@ -6244,7 +6254,7 @@
             <p:spPr>
               <a:xfrm>
                 <a:off x="2301396" y="791496"/>
-                <a:ext cx="464999" cy="415050"/>
+                <a:ext cx="477246" cy="417358"/>
               </a:xfrm>
               <a:prstGeom prst="rect">
                 <a:avLst/>
@@ -6252,7 +6262,7 @@
               <a:blipFill rotWithShape="1">
                 <a:blip r:embed="rId3"/>
                 <a:stretch>
-                  <a:fillRect b="-5882"/>
+                  <a:fillRect b="-7353"/>
                 </a:stretch>
               </a:blipFill>
             </p:spPr>
@@ -6282,7 +6292,7 @@
             <p:spPr>
               <a:xfrm>
                 <a:off x="2301395" y="1678375"/>
-                <a:ext cx="469936" cy="385362"/>
+                <a:ext cx="477246" cy="376513"/>
               </a:xfrm>
               <a:prstGeom prst="rect">
                 <a:avLst/>
@@ -6295,6 +6305,7 @@
               </a:bodyPr>
               <a:lstStyle/>
               <a:p>
+                <a:pPr/>
                 <a14:m>
                   <m:oMathPara xmlns:m="http://schemas.openxmlformats.org/officeDocument/2006/math">
                     <m:oMathParaPr>
@@ -6304,7 +6315,9 @@
                       <m:sSubSup>
                         <m:sSubSupPr>
                           <m:ctrlPr>
-                            <a:rPr lang="ko-KR" altLang="ko-KR" i="1" smtClean="0"/>
+                            <a:rPr lang="ko-KR" altLang="ko-KR" i="1" smtClean="0">
+                              <a:latin typeface="Cambria Math"/>
+                            </a:rPr>
                           </m:ctrlPr>
                         </m:sSubSupPr>
                         <m:e>
@@ -6312,7 +6325,9 @@
                             <m:rPr>
                               <m:sty m:val="p"/>
                             </m:rPr>
-                            <a:rPr lang="en-US" altLang="ko-KR"/>
+                            <a:rPr lang="en-US" altLang="ko-KR">
+                              <a:latin typeface="Cambria Math"/>
+                            </a:rPr>
                             <m:t>Z</m:t>
                           </m:r>
                         </m:e>
@@ -6329,7 +6344,7 @@
                             <a:rPr lang="en-US" altLang="ko-KR" b="0" i="1" smtClean="0">
                               <a:latin typeface="Cambria Math"/>
                             </a:rPr>
-                            <m:t>1</m:t>
+                            <m:t>0</m:t>
                           </m:r>
                         </m:sup>
                       </m:sSubSup>
@@ -6353,7 +6368,7 @@
             <p:spPr>
               <a:xfrm>
                 <a:off x="2301395" y="1678375"/>
-                <a:ext cx="469936" cy="385362"/>
+                <a:ext cx="477246" cy="376513"/>
               </a:xfrm>
               <a:prstGeom prst="rect">
                 <a:avLst/>
@@ -6361,7 +6376,7 @@
               <a:blipFill rotWithShape="1">
                 <a:blip r:embed="rId4"/>
                 <a:stretch>
-                  <a:fillRect/>
+                  <a:fillRect b="-1613"/>
                 </a:stretch>
               </a:blipFill>
             </p:spPr>
@@ -6391,7 +6406,7 @@
             <p:spPr>
               <a:xfrm>
                 <a:off x="2293084" y="3173694"/>
-                <a:ext cx="464999" cy="385362"/>
+                <a:ext cx="477246" cy="374205"/>
               </a:xfrm>
               <a:prstGeom prst="rect">
                 <a:avLst/>
@@ -6404,6 +6419,7 @@
               </a:bodyPr>
               <a:lstStyle/>
               <a:p>
+                <a:pPr/>
                 <a14:m>
                   <m:oMathPara xmlns:m="http://schemas.openxmlformats.org/officeDocument/2006/math">
                     <m:oMathParaPr>
@@ -6413,7 +6429,9 @@
                       <m:sSubSup>
                         <m:sSubSupPr>
                           <m:ctrlPr>
-                            <a:rPr lang="ko-KR" altLang="ko-KR" i="1" smtClean="0"/>
+                            <a:rPr lang="ko-KR" altLang="ko-KR" i="1" smtClean="0">
+                              <a:latin typeface="Cambria Math"/>
+                            </a:rPr>
                           </m:ctrlPr>
                         </m:sSubSupPr>
                         <m:e>
@@ -6421,7 +6439,9 @@
                             <m:rPr>
                               <m:sty m:val="p"/>
                             </m:rPr>
-                            <a:rPr lang="en-US" altLang="ko-KR"/>
+                            <a:rPr lang="en-US" altLang="ko-KR">
+                              <a:latin typeface="Cambria Math"/>
+                            </a:rPr>
                             <m:t>Z</m:t>
                           </m:r>
                         </m:e>
@@ -6438,7 +6458,7 @@
                             <a:rPr lang="en-US" altLang="ko-KR" b="0" i="1" smtClean="0">
                               <a:latin typeface="Cambria Math"/>
                             </a:rPr>
-                            <m:t>1</m:t>
+                            <m:t>0</m:t>
                           </m:r>
                         </m:sup>
                       </m:sSubSup>
@@ -6462,7 +6482,7 @@
             <p:spPr>
               <a:xfrm>
                 <a:off x="2293084" y="3173694"/>
-                <a:ext cx="464999" cy="385362"/>
+                <a:ext cx="477246" cy="374205"/>
               </a:xfrm>
               <a:prstGeom prst="rect">
                 <a:avLst/>
@@ -6470,7 +6490,7 @@
               <a:blipFill rotWithShape="1">
                 <a:blip r:embed="rId5"/>
                 <a:stretch>
-                  <a:fillRect b="-1587"/>
+                  <a:fillRect b="-3279"/>
                 </a:stretch>
               </a:blipFill>
             </p:spPr>
@@ -6500,7 +6520,7 @@
             <p:spPr>
               <a:xfrm>
                 <a:off x="2326628" y="4499828"/>
-                <a:ext cx="567720" cy="385362"/>
+                <a:ext cx="575029" cy="376513"/>
               </a:xfrm>
               <a:prstGeom prst="rect">
                 <a:avLst/>
@@ -6513,6 +6533,7 @@
               </a:bodyPr>
               <a:lstStyle/>
               <a:p>
+                <a:pPr/>
                 <a14:m>
                   <m:oMathPara xmlns:m="http://schemas.openxmlformats.org/officeDocument/2006/math">
                     <m:oMathParaPr>
@@ -6522,7 +6543,9 @@
                       <m:sSubSup>
                         <m:sSubSupPr>
                           <m:ctrlPr>
-                            <a:rPr lang="ko-KR" altLang="ko-KR" i="1" smtClean="0"/>
+                            <a:rPr lang="ko-KR" altLang="ko-KR" i="1" smtClean="0">
+                              <a:latin typeface="Cambria Math"/>
+                            </a:rPr>
                           </m:ctrlPr>
                         </m:sSubSupPr>
                         <m:e>
@@ -6530,7 +6553,9 @@
                             <m:rPr>
                               <m:sty m:val="p"/>
                             </m:rPr>
-                            <a:rPr lang="en-US" altLang="ko-KR"/>
+                            <a:rPr lang="en-US" altLang="ko-KR">
+                              <a:latin typeface="Cambria Math"/>
+                            </a:rPr>
                             <m:t>Z</m:t>
                           </m:r>
                         </m:e>
@@ -6547,7 +6572,7 @@
                             <a:rPr lang="en-US" altLang="ko-KR" b="0" i="1" smtClean="0">
                               <a:latin typeface="Cambria Math"/>
                             </a:rPr>
-                            <m:t>1</m:t>
+                            <m:t>0</m:t>
                           </m:r>
                         </m:sup>
                       </m:sSubSup>
@@ -6571,7 +6596,7 @@
             <p:spPr>
               <a:xfrm>
                 <a:off x="2326628" y="4499828"/>
-                <a:ext cx="567720" cy="385362"/>
+                <a:ext cx="575029" cy="376513"/>
               </a:xfrm>
               <a:prstGeom prst="rect">
                 <a:avLst/>
@@ -6579,7 +6604,7 @@
               <a:blipFill rotWithShape="1">
                 <a:blip r:embed="rId6"/>
                 <a:stretch>
-                  <a:fillRect b="-1587"/>
+                  <a:fillRect b="-1613"/>
                 </a:stretch>
               </a:blipFill>
             </p:spPr>
@@ -6747,7 +6772,7 @@
             <p:spPr>
               <a:xfrm>
                 <a:off x="3614371" y="2396012"/>
-                <a:ext cx="468205" cy="371961"/>
+                <a:ext cx="473142" cy="374205"/>
               </a:xfrm>
               <a:prstGeom prst="rect">
                 <a:avLst/>
@@ -6760,6 +6785,7 @@
               </a:bodyPr>
               <a:lstStyle/>
               <a:p>
+                <a:pPr/>
                 <a14:m>
                   <m:oMathPara xmlns:m="http://schemas.openxmlformats.org/officeDocument/2006/math">
                     <m:oMathParaPr>
@@ -6769,7 +6795,9 @@
                       <m:sSubSup>
                         <m:sSubSupPr>
                           <m:ctrlPr>
-                            <a:rPr lang="ko-KR" altLang="ko-KR" i="1" smtClean="0"/>
+                            <a:rPr lang="ko-KR" altLang="ko-KR" i="1" smtClean="0">
+                              <a:latin typeface="Cambria Math"/>
+                            </a:rPr>
                           </m:ctrlPr>
                         </m:sSubSupPr>
                         <m:e>
@@ -6796,7 +6824,7 @@
                             <a:rPr lang="en-US" altLang="ko-KR" b="0" i="1" smtClean="0">
                               <a:latin typeface="Cambria Math"/>
                             </a:rPr>
-                            <m:t>1</m:t>
+                            <m:t>0</m:t>
                           </m:r>
                         </m:sup>
                       </m:sSubSup>
@@ -6820,7 +6848,7 @@
             <p:spPr>
               <a:xfrm>
                 <a:off x="3614371" y="2396012"/>
-                <a:ext cx="468205" cy="371961"/>
+                <a:ext cx="473142" cy="374205"/>
               </a:xfrm>
               <a:prstGeom prst="rect">
                 <a:avLst/>
@@ -6943,7 +6971,7 @@
             <p:spPr>
               <a:xfrm>
                 <a:off x="3582951" y="771266"/>
-                <a:ext cx="468205" cy="415050"/>
+                <a:ext cx="473142" cy="417358"/>
               </a:xfrm>
               <a:prstGeom prst="rect">
                 <a:avLst/>
@@ -6956,6 +6984,7 @@
               </a:bodyPr>
               <a:lstStyle/>
               <a:p>
+                <a:pPr/>
                 <a14:m>
                   <m:oMathPara xmlns:m="http://schemas.openxmlformats.org/officeDocument/2006/math">
                     <m:oMathParaPr>
@@ -6965,7 +6994,9 @@
                       <m:sSubSup>
                         <m:sSubSupPr>
                           <m:ctrlPr>
-                            <a:rPr lang="ko-KR" altLang="ko-KR" i="1" smtClean="0"/>
+                            <a:rPr lang="ko-KR" altLang="ko-KR" i="1" smtClean="0">
+                              <a:latin typeface="Cambria Math"/>
+                            </a:rPr>
                           </m:ctrlPr>
                         </m:sSubSupPr>
                         <m:e>
@@ -6992,7 +7023,7 @@
                             <a:rPr lang="en-US" altLang="ko-KR" b="0" i="1" smtClean="0">
                               <a:latin typeface="Cambria Math"/>
                             </a:rPr>
-                            <m:t>1</m:t>
+                            <m:t>0</m:t>
                           </m:r>
                         </m:sup>
                       </m:sSubSup>
@@ -7016,7 +7047,7 @@
             <p:spPr>
               <a:xfrm>
                 <a:off x="3582951" y="771266"/>
-                <a:ext cx="468205" cy="415050"/>
+                <a:ext cx="473142" cy="417358"/>
               </a:xfrm>
               <a:prstGeom prst="rect">
                 <a:avLst/>
@@ -7054,7 +7085,7 @@
             <p:spPr>
               <a:xfrm>
                 <a:off x="3582950" y="1658145"/>
-                <a:ext cx="473142" cy="374205"/>
+                <a:ext cx="473142" cy="376513"/>
               </a:xfrm>
               <a:prstGeom prst="rect">
                 <a:avLst/>
@@ -7067,6 +7098,7 @@
               </a:bodyPr>
               <a:lstStyle/>
               <a:p>
+                <a:pPr/>
                 <a14:m>
                   <m:oMathPara xmlns:m="http://schemas.openxmlformats.org/officeDocument/2006/math">
                     <m:oMathParaPr>
@@ -7076,7 +7108,9 @@
                       <m:sSubSup>
                         <m:sSubSupPr>
                           <m:ctrlPr>
-                            <a:rPr lang="ko-KR" altLang="ko-KR" i="1" smtClean="0"/>
+                            <a:rPr lang="ko-KR" altLang="ko-KR" i="1" smtClean="0">
+                              <a:latin typeface="Cambria Math"/>
+                            </a:rPr>
                           </m:ctrlPr>
                         </m:sSubSupPr>
                         <m:e>
@@ -7103,7 +7137,7 @@
                             <a:rPr lang="en-US" altLang="ko-KR" b="0" i="1" smtClean="0">
                               <a:latin typeface="Cambria Math"/>
                             </a:rPr>
-                            <m:t>1</m:t>
+                            <m:t>0</m:t>
                           </m:r>
                         </m:sup>
                       </m:sSubSup>
@@ -7127,7 +7161,7 @@
             <p:spPr>
               <a:xfrm>
                 <a:off x="3582950" y="1658145"/>
-                <a:ext cx="473142" cy="374205"/>
+                <a:ext cx="473142" cy="376513"/>
               </a:xfrm>
               <a:prstGeom prst="rect">
                 <a:avLst/>
@@ -7135,7 +7169,7 @@
               <a:blipFill rotWithShape="1">
                 <a:blip r:embed="rId9"/>
                 <a:stretch>
-                  <a:fillRect b="-3279"/>
+                  <a:fillRect b="-1613"/>
                 </a:stretch>
               </a:blipFill>
             </p:spPr>
@@ -7165,7 +7199,7 @@
             <p:spPr>
               <a:xfrm>
                 <a:off x="3574639" y="3153464"/>
-                <a:ext cx="468205" cy="415050"/>
+                <a:ext cx="473142" cy="417358"/>
               </a:xfrm>
               <a:prstGeom prst="rect">
                 <a:avLst/>
@@ -7178,6 +7212,7 @@
               </a:bodyPr>
               <a:lstStyle/>
               <a:p>
+                <a:pPr/>
                 <a14:m>
                   <m:oMathPara xmlns:m="http://schemas.openxmlformats.org/officeDocument/2006/math">
                     <m:oMathParaPr>
@@ -7187,7 +7222,9 @@
                       <m:sSubSup>
                         <m:sSubSupPr>
                           <m:ctrlPr>
-                            <a:rPr lang="ko-KR" altLang="ko-KR" i="1" smtClean="0"/>
+                            <a:rPr lang="ko-KR" altLang="ko-KR" i="1" smtClean="0">
+                              <a:latin typeface="Cambria Math"/>
+                            </a:rPr>
                           </m:ctrlPr>
                         </m:sSubSupPr>
                         <m:e>
@@ -7214,7 +7251,7 @@
                             <a:rPr lang="en-US" altLang="ko-KR" b="0" i="1" smtClean="0">
                               <a:latin typeface="Cambria Math"/>
                             </a:rPr>
-                            <m:t>1</m:t>
+                            <m:t>0</m:t>
                           </m:r>
                         </m:sup>
                       </m:sSubSup>
@@ -7238,7 +7275,7 @@
             <p:spPr>
               <a:xfrm>
                 <a:off x="3574639" y="3153464"/>
-                <a:ext cx="468205" cy="415050"/>
+                <a:ext cx="473142" cy="417358"/>
               </a:xfrm>
               <a:prstGeom prst="rect">
                 <a:avLst/>
@@ -7246,7 +7283,7 @@
               <a:blipFill rotWithShape="1">
                 <a:blip r:embed="rId10"/>
                 <a:stretch>
-                  <a:fillRect b="-7353"/>
+                  <a:fillRect b="-5797"/>
                 </a:stretch>
               </a:blipFill>
             </p:spPr>
@@ -7289,6 +7326,7 @@
               </a:bodyPr>
               <a:lstStyle/>
               <a:p>
+                <a:pPr/>
                 <a14:m>
                   <m:oMathPara xmlns:m="http://schemas.openxmlformats.org/officeDocument/2006/math">
                     <m:oMathParaPr>
@@ -7298,7 +7336,9 @@
                       <m:sSubSup>
                         <m:sSubSupPr>
                           <m:ctrlPr>
-                            <a:rPr lang="ko-KR" altLang="ko-KR" i="1" smtClean="0"/>
+                            <a:rPr lang="ko-KR" altLang="ko-KR" i="1" smtClean="0">
+                              <a:latin typeface="Cambria Math"/>
+                            </a:rPr>
                           </m:ctrlPr>
                         </m:sSubSupPr>
                         <m:e>
@@ -7325,7 +7365,7 @@
                             <a:rPr lang="en-US" altLang="ko-KR" b="0" i="1" smtClean="0">
                               <a:latin typeface="Cambria Math"/>
                             </a:rPr>
-                            <m:t>1</m:t>
+                            <m:t>0</m:t>
                           </m:r>
                         </m:sup>
                       </m:sSubSup>
@@ -7400,6 +7440,7 @@
               </a:bodyPr>
               <a:lstStyle/>
               <a:p>
+                <a:pPr/>
                 <a14:m>
                   <m:oMathPara xmlns:m="http://schemas.openxmlformats.org/officeDocument/2006/math">
                     <m:oMathParaPr>
@@ -7409,7 +7450,9 @@
                       <m:sSubSup>
                         <m:sSubSupPr>
                           <m:ctrlPr>
-                            <a:rPr lang="ko-KR" altLang="ko-KR" i="1" smtClean="0"/>
+                            <a:rPr lang="ko-KR" altLang="ko-KR" i="1" smtClean="0">
+                              <a:latin typeface="Cambria Math"/>
+                            </a:rPr>
                           </m:ctrlPr>
                         </m:sSubSupPr>
                         <m:e>
@@ -7436,7 +7479,7 @@
                             <a:rPr lang="en-US" altLang="ko-KR" b="0" i="1" smtClean="0">
                               <a:latin typeface="Cambria Math"/>
                             </a:rPr>
-                            <m:t>1</m:t>
+                            <m:t>0</m:t>
                           </m:r>
                         </m:sup>
                       </m:sSubSup>
@@ -7498,7 +7541,7 @@
             <p:spPr>
               <a:xfrm>
                 <a:off x="1308950" y="2801604"/>
-                <a:ext cx="598754" cy="383951"/>
+                <a:ext cx="598754" cy="386260"/>
               </a:xfrm>
               <a:prstGeom prst="rect">
                 <a:avLst/>
@@ -7511,6 +7554,7 @@
               </a:bodyPr>
               <a:lstStyle/>
               <a:p>
+                <a:pPr/>
                 <a14:m>
                   <m:oMathPara xmlns:m="http://schemas.openxmlformats.org/officeDocument/2006/math">
                     <m:oMathParaPr>
@@ -7520,7 +7564,9 @@
                       <m:sSubSup>
                         <m:sSubSupPr>
                           <m:ctrlPr>
-                            <a:rPr lang="ko-KR" altLang="ko-KR" i="1" smtClean="0"/>
+                            <a:rPr lang="ko-KR" altLang="ko-KR" i="1" smtClean="0">
+                              <a:latin typeface="Cambria Math"/>
+                            </a:rPr>
                           </m:ctrlPr>
                         </m:sSubSupPr>
                         <m:e>
@@ -7553,7 +7599,7 @@
                             <a:rPr lang="en-US" altLang="ko-KR" b="0" i="1" smtClean="0">
                               <a:latin typeface="Cambria Math"/>
                             </a:rPr>
-                            <m:t>1</m:t>
+                            <m:t>0</m:t>
                           </m:r>
                         </m:sup>
                       </m:sSubSup>
@@ -7577,7 +7623,7 @@
             <p:spPr>
               <a:xfrm>
                 <a:off x="1308950" y="2801604"/>
-                <a:ext cx="598754" cy="383951"/>
+                <a:ext cx="598754" cy="386260"/>
               </a:xfrm>
               <a:prstGeom prst="rect">
                 <a:avLst/>
@@ -7615,7 +7661,7 @@
             <p:spPr>
               <a:xfrm>
                 <a:off x="1270478" y="2261737"/>
-                <a:ext cx="637226" cy="374205"/>
+                <a:ext cx="637226" cy="376513"/>
               </a:xfrm>
               <a:prstGeom prst="rect">
                 <a:avLst/>
@@ -7628,6 +7674,7 @@
               </a:bodyPr>
               <a:lstStyle/>
               <a:p>
+                <a:pPr/>
                 <a14:m>
                   <m:oMathPara xmlns:m="http://schemas.openxmlformats.org/officeDocument/2006/math">
                     <m:oMathParaPr>
@@ -7637,7 +7684,9 @@
                       <m:sSubSup>
                         <m:sSubSupPr>
                           <m:ctrlPr>
-                            <a:rPr lang="ko-KR" altLang="ko-KR" i="1" smtClean="0"/>
+                            <a:rPr lang="ko-KR" altLang="ko-KR" i="1" smtClean="0">
+                              <a:latin typeface="Cambria Math"/>
+                            </a:rPr>
                           </m:ctrlPr>
                         </m:sSubSupPr>
                         <m:e>
@@ -7664,7 +7713,7 @@
                             <a:rPr lang="en-US" altLang="ko-KR" b="0" i="1" smtClean="0">
                               <a:latin typeface="Cambria Math"/>
                             </a:rPr>
-                            <m:t>1</m:t>
+                            <m:t>0</m:t>
                           </m:r>
                         </m:sup>
                       </m:sSubSup>
@@ -7688,7 +7737,7 @@
             <p:spPr>
               <a:xfrm>
                 <a:off x="1270478" y="2261737"/>
-                <a:ext cx="637226" cy="374205"/>
+                <a:ext cx="637226" cy="376513"/>
               </a:xfrm>
               <a:prstGeom prst="rect">
                 <a:avLst/>
@@ -7696,7 +7745,7 @@
               <a:blipFill rotWithShape="1">
                 <a:blip r:embed="rId14"/>
                 <a:stretch>
-                  <a:fillRect b="-3279"/>
+                  <a:fillRect b="-1613"/>
                 </a:stretch>
               </a:blipFill>
             </p:spPr>
@@ -7726,7 +7775,7 @@
             <p:spPr>
               <a:xfrm>
                 <a:off x="1259632" y="1610138"/>
-                <a:ext cx="631904" cy="374205"/>
+                <a:ext cx="631903" cy="376513"/>
               </a:xfrm>
               <a:prstGeom prst="rect">
                 <a:avLst/>
@@ -7739,6 +7788,7 @@
               </a:bodyPr>
               <a:lstStyle/>
               <a:p>
+                <a:pPr/>
                 <a14:m>
                   <m:oMathPara xmlns:m="http://schemas.openxmlformats.org/officeDocument/2006/math">
                     <m:oMathParaPr>
@@ -7748,7 +7798,9 @@
                       <m:sSubSup>
                         <m:sSubSupPr>
                           <m:ctrlPr>
-                            <a:rPr lang="ko-KR" altLang="ko-KR" i="1" smtClean="0"/>
+                            <a:rPr lang="ko-KR" altLang="ko-KR" i="1" smtClean="0">
+                              <a:latin typeface="Cambria Math"/>
+                            </a:rPr>
                           </m:ctrlPr>
                         </m:sSubSupPr>
                         <m:e>
@@ -7775,7 +7827,7 @@
                             <a:rPr lang="en-US" altLang="ko-KR" b="0" i="1" smtClean="0">
                               <a:latin typeface="Cambria Math"/>
                             </a:rPr>
-                            <m:t>1</m:t>
+                            <m:t>0</m:t>
                           </m:r>
                         </m:sup>
                       </m:sSubSup>
@@ -7799,7 +7851,7 @@
             <p:spPr>
               <a:xfrm>
                 <a:off x="1259632" y="1610138"/>
-                <a:ext cx="631904" cy="374205"/>
+                <a:ext cx="631903" cy="376513"/>
               </a:xfrm>
               <a:prstGeom prst="rect">
                 <a:avLst/>
@@ -7837,7 +7889,7 @@
             <p:spPr>
               <a:xfrm>
                 <a:off x="1242653" y="1182587"/>
-                <a:ext cx="637226" cy="374205"/>
+                <a:ext cx="637226" cy="376513"/>
               </a:xfrm>
               <a:prstGeom prst="rect">
                 <a:avLst/>
@@ -7850,6 +7902,7 @@
               </a:bodyPr>
               <a:lstStyle/>
               <a:p>
+                <a:pPr/>
                 <a14:m>
                   <m:oMathPara xmlns:m="http://schemas.openxmlformats.org/officeDocument/2006/math">
                     <m:oMathParaPr>
@@ -7859,7 +7912,9 @@
                       <m:sSubSup>
                         <m:sSubSupPr>
                           <m:ctrlPr>
-                            <a:rPr lang="ko-KR" altLang="ko-KR" i="1" smtClean="0"/>
+                            <a:rPr lang="ko-KR" altLang="ko-KR" i="1" smtClean="0">
+                              <a:latin typeface="Cambria Math"/>
+                            </a:rPr>
                           </m:ctrlPr>
                         </m:sSubSupPr>
                         <m:e>
@@ -7886,7 +7941,7 @@
                             <a:rPr lang="en-US" altLang="ko-KR" b="0" i="1" smtClean="0">
                               <a:latin typeface="Cambria Math"/>
                             </a:rPr>
-                            <m:t>1</m:t>
+                            <m:t>0</m:t>
                           </m:r>
                         </m:sup>
                       </m:sSubSup>
@@ -7910,7 +7965,7 @@
             <p:spPr>
               <a:xfrm>
                 <a:off x="1242653" y="1182587"/>
-                <a:ext cx="637226" cy="374205"/>
+                <a:ext cx="637226" cy="376513"/>
               </a:xfrm>
               <a:prstGeom prst="rect">
                 <a:avLst/>
@@ -7918,7 +7973,7 @@
               <a:blipFill rotWithShape="1">
                 <a:blip r:embed="rId16"/>
                 <a:stretch>
-                  <a:fillRect b="-3279"/>
+                  <a:fillRect b="-1613"/>
                 </a:stretch>
               </a:blipFill>
             </p:spPr>
@@ -7948,7 +8003,7 @@
             <p:spPr>
               <a:xfrm>
                 <a:off x="1259632" y="781306"/>
-                <a:ext cx="585288" cy="415050"/>
+                <a:ext cx="585288" cy="417358"/>
               </a:xfrm>
               <a:prstGeom prst="rect">
                 <a:avLst/>
@@ -7961,6 +8016,7 @@
               </a:bodyPr>
               <a:lstStyle/>
               <a:p>
+                <a:pPr/>
                 <a14:m>
                   <m:oMathPara xmlns:m="http://schemas.openxmlformats.org/officeDocument/2006/math">
                     <m:oMathParaPr>
@@ -7970,7 +8026,9 @@
                       <m:sSubSup>
                         <m:sSubSupPr>
                           <m:ctrlPr>
-                            <a:rPr lang="ko-KR" altLang="ko-KR" i="1" smtClean="0"/>
+                            <a:rPr lang="ko-KR" altLang="ko-KR" i="1" smtClean="0">
+                              <a:latin typeface="Cambria Math"/>
+                            </a:rPr>
                           </m:ctrlPr>
                         </m:sSubSupPr>
                         <m:e>
@@ -7997,7 +8055,7 @@
                             <a:rPr lang="en-US" altLang="ko-KR" b="0" i="1" smtClean="0">
                               <a:latin typeface="Cambria Math"/>
                             </a:rPr>
-                            <m:t>1</m:t>
+                            <m:t>0</m:t>
                           </m:r>
                         </m:sup>
                       </m:sSubSup>
@@ -8021,7 +8079,7 @@
             <p:spPr>
               <a:xfrm>
                 <a:off x="1259632" y="781306"/>
-                <a:ext cx="585288" cy="415050"/>
+                <a:ext cx="585288" cy="417358"/>
               </a:xfrm>
               <a:prstGeom prst="rect">
                 <a:avLst/>
@@ -8029,7 +8087,7 @@
               <a:blipFill rotWithShape="1">
                 <a:blip r:embed="rId17"/>
                 <a:stretch>
-                  <a:fillRect b="-7353"/>
+                  <a:fillRect b="-5797"/>
                 </a:stretch>
               </a:blipFill>
             </p:spPr>
@@ -8048,8 +8106,8 @@
           </p:sp>
         </mc:Fallback>
       </mc:AlternateContent>
-      <mc:AlternateContent xmlns:mc="http://schemas.openxmlformats.org/markup-compatibility/2006">
-        <mc:Choice xmlns:a14="http://schemas.microsoft.com/office/drawing/2010/main" Requires="a14">
+      <mc:AlternateContent xmlns:mc="http://schemas.openxmlformats.org/markup-compatibility/2006" xmlns:a14="http://schemas.microsoft.com/office/drawing/2010/main">
+        <mc:Choice Requires="a14">
           <p:sp>
             <p:nvSpPr>
               <p:cNvPr id="211" name="TextBox 210"/>
@@ -8072,6 +8130,7 @@
               </a:bodyPr>
               <a:lstStyle/>
               <a:p>
+                <a:pPr/>
                 <a14:m>
                   <m:oMathPara xmlns:m="http://schemas.openxmlformats.org/officeDocument/2006/math">
                     <m:oMathParaPr>
@@ -8081,7 +8140,9 @@
                       <m:sSubSup>
                         <m:sSubSupPr>
                           <m:ctrlPr>
-                            <a:rPr lang="ko-KR" altLang="ko-KR" i="1" smtClean="0"/>
+                            <a:rPr lang="ko-KR" altLang="ko-KR" i="1" smtClean="0">
+                              <a:latin typeface="Cambria Math"/>
+                            </a:rPr>
                           </m:ctrlPr>
                         </m:sSubSupPr>
                         <m:e>
@@ -8120,7 +8181,7 @@
             </p:txBody>
           </p:sp>
         </mc:Choice>
-        <mc:Fallback>
+        <mc:Fallback xmlns="">
           <p:sp>
             <p:nvSpPr>
               <p:cNvPr id="211" name="TextBox 210"/>
@@ -8170,7 +8231,7 @@
             <p:spPr>
               <a:xfrm>
                 <a:off x="4172100" y="2231747"/>
-                <a:ext cx="597471" cy="415627"/>
+                <a:ext cx="597471" cy="415050"/>
               </a:xfrm>
               <a:prstGeom prst="rect">
                 <a:avLst/>
@@ -8183,6 +8244,7 @@
               </a:bodyPr>
               <a:lstStyle/>
               <a:p>
+                <a:pPr/>
                 <a14:m>
                   <m:oMathPara xmlns:m="http://schemas.openxmlformats.org/officeDocument/2006/math">
                     <m:oMathParaPr>
@@ -8192,7 +8254,9 @@
                       <m:sSubSup>
                         <m:sSubSupPr>
                           <m:ctrlPr>
-                            <a:rPr lang="ko-KR" altLang="ko-KR" i="1" smtClean="0"/>
+                            <a:rPr lang="ko-KR" altLang="ko-KR" i="1" smtClean="0">
+                              <a:latin typeface="Cambria Math"/>
+                            </a:rPr>
                           </m:ctrlPr>
                         </m:sSubSupPr>
                         <m:e>
@@ -8225,7 +8289,7 @@
                             <a:rPr lang="en-US" altLang="ko-KR" b="0" i="1" smtClean="0">
                               <a:latin typeface="Cambria Math"/>
                             </a:rPr>
-                            <m:t>2</m:t>
+                            <m:t>1</m:t>
                           </m:r>
                         </m:sup>
                       </m:sSubSup>
@@ -8249,7 +8313,7 @@
             <p:spPr>
               <a:xfrm>
                 <a:off x="4172100" y="2231747"/>
-                <a:ext cx="597471" cy="415627"/>
+                <a:ext cx="597471" cy="415050"/>
               </a:xfrm>
               <a:prstGeom prst="rect">
                 <a:avLst/>
@@ -8287,7 +8351,7 @@
             <p:spPr>
               <a:xfrm>
                 <a:off x="4190304" y="1580148"/>
-                <a:ext cx="631904" cy="374783"/>
+                <a:ext cx="631904" cy="374205"/>
               </a:xfrm>
               <a:prstGeom prst="rect">
                 <a:avLst/>
@@ -8300,6 +8364,7 @@
               </a:bodyPr>
               <a:lstStyle/>
               <a:p>
+                <a:pPr/>
                 <a14:m>
                   <m:oMathPara xmlns:m="http://schemas.openxmlformats.org/officeDocument/2006/math">
                     <m:oMathParaPr>
@@ -8309,7 +8374,9 @@
                       <m:sSubSup>
                         <m:sSubSupPr>
                           <m:ctrlPr>
-                            <a:rPr lang="ko-KR" altLang="ko-KR" i="1" smtClean="0"/>
+                            <a:rPr lang="ko-KR" altLang="ko-KR" i="1" smtClean="0">
+                              <a:latin typeface="Cambria Math"/>
+                            </a:rPr>
                           </m:ctrlPr>
                         </m:sSubSupPr>
                         <m:e>
@@ -8336,7 +8403,7 @@
                             <a:rPr lang="en-US" altLang="ko-KR" b="0" i="1" smtClean="0">
                               <a:latin typeface="Cambria Math"/>
                             </a:rPr>
-                            <m:t>2</m:t>
+                            <m:t>1</m:t>
                           </m:r>
                         </m:sup>
                       </m:sSubSup>
@@ -8360,7 +8427,7 @@
             <p:spPr>
               <a:xfrm>
                 <a:off x="4190304" y="1580148"/>
-                <a:ext cx="631904" cy="374783"/>
+                <a:ext cx="631904" cy="374205"/>
               </a:xfrm>
               <a:prstGeom prst="rect">
                 <a:avLst/>
@@ -8398,7 +8465,7 @@
             <p:spPr>
               <a:xfrm>
                 <a:off x="4250784" y="1152597"/>
-                <a:ext cx="637226" cy="374783"/>
+                <a:ext cx="661591" cy="374783"/>
               </a:xfrm>
               <a:prstGeom prst="rect">
                 <a:avLst/>
@@ -8411,6 +8478,7 @@
               </a:bodyPr>
               <a:lstStyle/>
               <a:p>
+                <a:pPr/>
                 <a14:m>
                   <m:oMathPara xmlns:m="http://schemas.openxmlformats.org/officeDocument/2006/math">
                     <m:oMathParaPr>
@@ -8420,7 +8488,9 @@
                       <m:sSubSup>
                         <m:sSubSupPr>
                           <m:ctrlPr>
-                            <a:rPr lang="ko-KR" altLang="ko-KR" i="1" smtClean="0"/>
+                            <a:rPr lang="ko-KR" altLang="ko-KR" i="1" smtClean="0">
+                              <a:latin typeface="Cambria Math"/>
+                            </a:rPr>
                           </m:ctrlPr>
                         </m:sSubSupPr>
                         <m:e>
@@ -8447,7 +8517,7 @@
                             <a:rPr lang="en-US" altLang="ko-KR" b="0" i="1" smtClean="0">
                               <a:latin typeface="Cambria Math"/>
                             </a:rPr>
-                            <m:t>2</m:t>
+                            <m:t>1</m:t>
                           </m:r>
                         </m:sup>
                       </m:sSubSup>
@@ -8471,7 +8541,7 @@
             <p:spPr>
               <a:xfrm>
                 <a:off x="4250784" y="1152597"/>
-                <a:ext cx="637226" cy="374783"/>
+                <a:ext cx="661591" cy="374783"/>
               </a:xfrm>
               <a:prstGeom prst="rect">
                 <a:avLst/>
@@ -8509,7 +8579,7 @@
             <p:spPr>
               <a:xfrm>
                 <a:off x="4267763" y="751316"/>
-                <a:ext cx="607218" cy="415627"/>
+                <a:ext cx="607218" cy="415050"/>
               </a:xfrm>
               <a:prstGeom prst="rect">
                 <a:avLst/>
@@ -8522,6 +8592,7 @@
               </a:bodyPr>
               <a:lstStyle/>
               <a:p>
+                <a:pPr/>
                 <a14:m>
                   <m:oMathPara xmlns:m="http://schemas.openxmlformats.org/officeDocument/2006/math">
                     <m:oMathParaPr>
@@ -8531,7 +8602,9 @@
                       <m:sSubSup>
                         <m:sSubSupPr>
                           <m:ctrlPr>
-                            <a:rPr lang="ko-KR" altLang="ko-KR" i="1" smtClean="0"/>
+                            <a:rPr lang="ko-KR" altLang="ko-KR" i="1" smtClean="0">
+                              <a:latin typeface="Cambria Math"/>
+                            </a:rPr>
                           </m:ctrlPr>
                         </m:sSubSupPr>
                         <m:e>
@@ -8558,7 +8631,7 @@
                             <a:rPr lang="en-US" altLang="ko-KR" b="0" i="1" smtClean="0">
                               <a:latin typeface="Cambria Math"/>
                             </a:rPr>
-                            <m:t>2</m:t>
+                            <m:t>1</m:t>
                           </m:r>
                         </m:sup>
                       </m:sSubSup>
@@ -8582,7 +8655,7 @@
             <p:spPr>
               <a:xfrm>
                 <a:off x="4267763" y="751316"/>
-                <a:ext cx="607218" cy="415627"/>
+                <a:ext cx="607218" cy="415050"/>
               </a:xfrm>
               <a:prstGeom prst="rect">
                 <a:avLst/>
@@ -8620,7 +8693,7 @@
             <p:spPr>
               <a:xfrm>
                 <a:off x="4946572" y="2389450"/>
-                <a:ext cx="469936" cy="385939"/>
+                <a:ext cx="472309" cy="371961"/>
               </a:xfrm>
               <a:prstGeom prst="rect">
                 <a:avLst/>
@@ -8633,6 +8706,7 @@
               </a:bodyPr>
               <a:lstStyle/>
               <a:p>
+                <a:pPr/>
                 <a14:m>
                   <m:oMathPara xmlns:m="http://schemas.openxmlformats.org/officeDocument/2006/math">
                     <m:oMathParaPr>
@@ -8642,7 +8716,9 @@
                       <m:sSubSup>
                         <m:sSubSupPr>
                           <m:ctrlPr>
-                            <a:rPr lang="ko-KR" altLang="ko-KR" i="1" smtClean="0"/>
+                            <a:rPr lang="ko-KR" altLang="ko-KR" i="1" smtClean="0">
+                              <a:latin typeface="Cambria Math"/>
+                            </a:rPr>
                           </m:ctrlPr>
                         </m:sSubSupPr>
                         <m:e>
@@ -8650,7 +8726,9 @@
                             <m:rPr>
                               <m:sty m:val="p"/>
                             </m:rPr>
-                            <a:rPr lang="en-US" altLang="ko-KR"/>
+                            <a:rPr lang="en-US" altLang="ko-KR">
+                              <a:latin typeface="Cambria Math"/>
+                            </a:rPr>
                             <m:t>Z</m:t>
                           </m:r>
                         </m:e>
@@ -8667,7 +8745,7 @@
                             <a:rPr lang="en-US" altLang="ko-KR" b="0" i="1" smtClean="0">
                               <a:latin typeface="Cambria Math"/>
                             </a:rPr>
-                            <m:t>2</m:t>
+                            <m:t>1</m:t>
                           </m:r>
                         </m:sup>
                       </m:sSubSup>
@@ -8691,7 +8769,7 @@
             <p:spPr>
               <a:xfrm>
                 <a:off x="4946572" y="2389450"/>
-                <a:ext cx="469936" cy="385939"/>
+                <a:ext cx="472309" cy="371961"/>
               </a:xfrm>
               <a:prstGeom prst="rect">
                 <a:avLst/>
@@ -8699,7 +8777,7 @@
               <a:blipFill rotWithShape="1">
                 <a:blip r:embed="rId23"/>
                 <a:stretch>
-                  <a:fillRect b="-1587"/>
+                  <a:fillRect b="-3279"/>
                 </a:stretch>
               </a:blipFill>
             </p:spPr>
@@ -8729,7 +8807,7 @@
             <p:spPr>
               <a:xfrm>
                 <a:off x="4915152" y="764704"/>
-                <a:ext cx="479683" cy="385939"/>
+                <a:ext cx="479683" cy="379719"/>
               </a:xfrm>
               <a:prstGeom prst="rect">
                 <a:avLst/>
@@ -8742,6 +8820,7 @@
               </a:bodyPr>
               <a:lstStyle/>
               <a:p>
+                <a:pPr/>
                 <a14:m>
                   <m:oMathPara xmlns:m="http://schemas.openxmlformats.org/officeDocument/2006/math">
                     <m:oMathParaPr>
@@ -8751,7 +8830,9 @@
                       <m:sSubSup>
                         <m:sSubSupPr>
                           <m:ctrlPr>
-                            <a:rPr lang="ko-KR" altLang="ko-KR" i="1" smtClean="0"/>
+                            <a:rPr lang="ko-KR" altLang="ko-KR" i="1" smtClean="0">
+                              <a:latin typeface="Cambria Math"/>
+                            </a:rPr>
                           </m:ctrlPr>
                         </m:sSubSupPr>
                         <m:e>
@@ -8759,7 +8840,9 @@
                             <m:rPr>
                               <m:sty m:val="p"/>
                             </m:rPr>
-                            <a:rPr lang="en-US" altLang="ko-KR"/>
+                            <a:rPr lang="en-US" altLang="ko-KR">
+                              <a:latin typeface="Cambria Math"/>
+                            </a:rPr>
                             <m:t>Z</m:t>
                           </m:r>
                         </m:e>
@@ -8776,7 +8859,7 @@
                             <a:rPr lang="en-US" altLang="ko-KR" b="0" i="1" smtClean="0">
                               <a:latin typeface="Cambria Math"/>
                             </a:rPr>
-                            <m:t>2</m:t>
+                            <m:t>1</m:t>
                           </m:r>
                         </m:sup>
                       </m:sSubSup>
@@ -8800,7 +8883,7 @@
             <p:spPr>
               <a:xfrm>
                 <a:off x="4915152" y="764704"/>
-                <a:ext cx="479683" cy="385939"/>
+                <a:ext cx="479683" cy="379719"/>
               </a:xfrm>
               <a:prstGeom prst="rect">
                 <a:avLst/>
@@ -8808,7 +8891,7 @@
               <a:blipFill rotWithShape="1">
                 <a:blip r:embed="rId24"/>
                 <a:stretch>
-                  <a:fillRect/>
+                  <a:fillRect b="-1587"/>
                 </a:stretch>
               </a:blipFill>
             </p:spPr>
@@ -8838,7 +8921,7 @@
             <p:spPr>
               <a:xfrm>
                 <a:off x="4915151" y="1651583"/>
-                <a:ext cx="469936" cy="385939"/>
+                <a:ext cx="472309" cy="374205"/>
               </a:xfrm>
               <a:prstGeom prst="rect">
                 <a:avLst/>
@@ -8851,6 +8934,7 @@
               </a:bodyPr>
               <a:lstStyle/>
               <a:p>
+                <a:pPr/>
                 <a14:m>
                   <m:oMathPara xmlns:m="http://schemas.openxmlformats.org/officeDocument/2006/math">
                     <m:oMathParaPr>
@@ -8860,7 +8944,9 @@
                       <m:sSubSup>
                         <m:sSubSupPr>
                           <m:ctrlPr>
-                            <a:rPr lang="ko-KR" altLang="ko-KR" i="1" smtClean="0"/>
+                            <a:rPr lang="ko-KR" altLang="ko-KR" i="1" smtClean="0">
+                              <a:latin typeface="Cambria Math"/>
+                            </a:rPr>
                           </m:ctrlPr>
                         </m:sSubSupPr>
                         <m:e>
@@ -8868,7 +8954,9 @@
                             <m:rPr>
                               <m:sty m:val="p"/>
                             </m:rPr>
-                            <a:rPr lang="en-US" altLang="ko-KR"/>
+                            <a:rPr lang="en-US" altLang="ko-KR">
+                              <a:latin typeface="Cambria Math"/>
+                            </a:rPr>
                             <m:t>Z</m:t>
                           </m:r>
                         </m:e>
@@ -8885,7 +8973,7 @@
                             <a:rPr lang="en-US" altLang="ko-KR" b="0" i="1" smtClean="0">
                               <a:latin typeface="Cambria Math"/>
                             </a:rPr>
-                            <m:t>2</m:t>
+                            <m:t>1</m:t>
                           </m:r>
                         </m:sup>
                       </m:sSubSup>
@@ -8909,7 +8997,7 @@
             <p:spPr>
               <a:xfrm>
                 <a:off x="4915151" y="1651583"/>
-                <a:ext cx="469936" cy="385939"/>
+                <a:ext cx="472309" cy="374205"/>
               </a:xfrm>
               <a:prstGeom prst="rect">
                 <a:avLst/>
@@ -8917,7 +9005,7 @@
               <a:blipFill rotWithShape="1">
                 <a:blip r:embed="rId25"/>
                 <a:stretch>
-                  <a:fillRect b="-1587"/>
+                  <a:fillRect b="-3279"/>
                 </a:stretch>
               </a:blipFill>
             </p:spPr>
@@ -8947,7 +9035,7 @@
             <p:spPr>
               <a:xfrm>
                 <a:off x="4906840" y="3146902"/>
-                <a:ext cx="479682" cy="385939"/>
+                <a:ext cx="479683" cy="379719"/>
               </a:xfrm>
               <a:prstGeom prst="rect">
                 <a:avLst/>
@@ -8960,6 +9048,7 @@
               </a:bodyPr>
               <a:lstStyle/>
               <a:p>
+                <a:pPr/>
                 <a14:m>
                   <m:oMathPara xmlns:m="http://schemas.openxmlformats.org/officeDocument/2006/math">
                     <m:oMathParaPr>
@@ -8969,7 +9058,9 @@
                       <m:sSubSup>
                         <m:sSubSupPr>
                           <m:ctrlPr>
-                            <a:rPr lang="ko-KR" altLang="ko-KR" i="1" smtClean="0"/>
+                            <a:rPr lang="ko-KR" altLang="ko-KR" i="1" smtClean="0">
+                              <a:latin typeface="Cambria Math"/>
+                            </a:rPr>
                           </m:ctrlPr>
                         </m:sSubSupPr>
                         <m:e>
@@ -8977,7 +9068,9 @@
                             <m:rPr>
                               <m:sty m:val="p"/>
                             </m:rPr>
-                            <a:rPr lang="en-US" altLang="ko-KR"/>
+                            <a:rPr lang="en-US" altLang="ko-KR">
+                              <a:latin typeface="Cambria Math"/>
+                            </a:rPr>
                             <m:t>Z</m:t>
                           </m:r>
                         </m:e>
@@ -8994,7 +9087,7 @@
                             <a:rPr lang="en-US" altLang="ko-KR" b="0" i="1" smtClean="0">
                               <a:latin typeface="Cambria Math"/>
                             </a:rPr>
-                            <m:t>2</m:t>
+                            <m:t>1</m:t>
                           </m:r>
                         </m:sup>
                       </m:sSubSup>
@@ -9018,7 +9111,7 @@
             <p:spPr>
               <a:xfrm>
                 <a:off x="4906840" y="3146902"/>
-                <a:ext cx="479682" cy="385939"/>
+                <a:ext cx="479683" cy="379719"/>
               </a:xfrm>
               <a:prstGeom prst="rect">
                 <a:avLst/>
@@ -9026,7 +9119,7 @@
               <a:blipFill rotWithShape="1">
                 <a:blip r:embed="rId26"/>
                 <a:stretch>
-                  <a:fillRect/>
+                  <a:fillRect b="-1587"/>
                 </a:stretch>
               </a:blipFill>
             </p:spPr>
@@ -9056,7 +9149,7 @@
             <p:spPr>
               <a:xfrm>
                 <a:off x="4940384" y="4195766"/>
-                <a:ext cx="469937" cy="385939"/>
+                <a:ext cx="472309" cy="373949"/>
               </a:xfrm>
               <a:prstGeom prst="rect">
                 <a:avLst/>
@@ -9069,6 +9162,7 @@
               </a:bodyPr>
               <a:lstStyle/>
               <a:p>
+                <a:pPr/>
                 <a14:m>
                   <m:oMathPara xmlns:m="http://schemas.openxmlformats.org/officeDocument/2006/math">
                     <m:oMathParaPr>
@@ -9078,7 +9172,9 @@
                       <m:sSubSup>
                         <m:sSubSupPr>
                           <m:ctrlPr>
-                            <a:rPr lang="ko-KR" altLang="ko-KR" i="1" smtClean="0"/>
+                            <a:rPr lang="ko-KR" altLang="ko-KR" i="1" smtClean="0">
+                              <a:latin typeface="Cambria Math"/>
+                            </a:rPr>
                           </m:ctrlPr>
                         </m:sSubSupPr>
                         <m:e>
@@ -9086,7 +9182,9 @@
                             <m:rPr>
                               <m:sty m:val="p"/>
                             </m:rPr>
-                            <a:rPr lang="en-US" altLang="ko-KR"/>
+                            <a:rPr lang="en-US" altLang="ko-KR">
+                              <a:latin typeface="Cambria Math"/>
+                            </a:rPr>
                             <m:t>Z</m:t>
                           </m:r>
                         </m:e>
@@ -9103,7 +9201,7 @@
                             <a:rPr lang="en-US" altLang="ko-KR" b="0" i="1" smtClean="0">
                               <a:latin typeface="Cambria Math"/>
                             </a:rPr>
-                            <m:t>2</m:t>
+                            <m:t>1</m:t>
                           </m:r>
                         </m:sup>
                       </m:sSubSup>
@@ -9127,7 +9225,7 @@
             <p:spPr>
               <a:xfrm>
                 <a:off x="4940384" y="4195766"/>
-                <a:ext cx="469937" cy="385939"/>
+                <a:ext cx="472309" cy="373949"/>
               </a:xfrm>
               <a:prstGeom prst="rect">
                 <a:avLst/>
@@ -9135,7 +9233,7 @@
               <a:blipFill rotWithShape="1">
                 <a:blip r:embed="rId27"/>
                 <a:stretch>
-                  <a:fillRect/>
+                  <a:fillRect b="-1613"/>
                 </a:stretch>
               </a:blipFill>
             </p:spPr>
@@ -9165,7 +9263,7 @@
             <p:spPr>
               <a:xfrm>
                 <a:off x="2418345" y="5058133"/>
-                <a:ext cx="1368836" cy="379271"/>
+                <a:ext cx="1377557" cy="381323"/>
               </a:xfrm>
               <a:prstGeom prst="rect">
                 <a:avLst/>
@@ -9177,6 +9275,7 @@
               </a:bodyPr>
               <a:lstStyle/>
               <a:p>
+                <a:pPr/>
                 <a14:m>
                   <m:oMathPara xmlns:m="http://schemas.openxmlformats.org/officeDocument/2006/math">
                     <m:oMathParaPr>
@@ -9186,7 +9285,9 @@
                       <m:func>
                         <m:funcPr>
                           <m:ctrlPr>
-                            <a:rPr lang="ko-KR" altLang="ko-KR" sz="1600" i="1" smtClean="0"/>
+                            <a:rPr lang="ko-KR" altLang="ko-KR" sz="1600" i="1" smtClean="0">
+                              <a:latin typeface="Cambria Math"/>
+                            </a:rPr>
                           </m:ctrlPr>
                         </m:funcPr>
                         <m:fName>
@@ -9194,7 +9295,9 @@
                             <m:rPr>
                               <m:sty m:val="p"/>
                             </m:rPr>
-                            <a:rPr lang="en-US" altLang="ko-KR" sz="1600"/>
+                            <a:rPr lang="en-US" altLang="ko-KR" sz="1600">
+                              <a:latin typeface="Cambria Math"/>
+                            </a:rPr>
                             <m:t>tanh</m:t>
                           </m:r>
                         </m:fName>
@@ -9228,10 +9331,10 @@
                             </m:sub>
                             <m:sup>
                               <m:r>
-                                <a:rPr lang="en-US" altLang="ko-KR" sz="1600" i="1">
+                                <a:rPr lang="en-US" altLang="ko-KR" sz="1600" b="0" i="1" smtClean="0">
                                   <a:latin typeface="Cambria Math"/>
                                 </a:rPr>
-                                <m:t>1</m:t>
+                                <m:t>0</m:t>
                               </m:r>
                             </m:sup>
                           </m:sSubSup>
@@ -9272,10 +9375,10 @@
                         </m:sub>
                         <m:sup>
                           <m:r>
-                            <a:rPr lang="en-US" altLang="ko-KR" sz="1600" i="1">
-                              <a:latin typeface="Cambria Math"/>
-                            </a:rPr>
-                            <m:t>1</m:t>
+                            <a:rPr lang="en-US" altLang="ko-KR" sz="1600" b="0" i="1" smtClean="0">
+                              <a:latin typeface="Cambria Math"/>
+                            </a:rPr>
+                            <m:t>0</m:t>
                           </m:r>
                         </m:sup>
                       </m:sSubSup>
@@ -9299,7 +9402,7 @@
             <p:spPr>
               <a:xfrm>
                 <a:off x="2418345" y="5058133"/>
-                <a:ext cx="1368836" cy="379271"/>
+                <a:ext cx="1377557" cy="381323"/>
               </a:xfrm>
               <a:prstGeom prst="rect">
                 <a:avLst/>
@@ -9349,6 +9452,7 @@
               </a:bodyPr>
               <a:lstStyle/>
               <a:p>
+                <a:pPr/>
                 <a14:m>
                   <m:oMathPara xmlns:m="http://schemas.openxmlformats.org/officeDocument/2006/math">
                     <m:oMathParaPr>
@@ -9360,7 +9464,9 @@
                           <m:chr m:val="∑"/>
                           <m:limLoc m:val="undOvr"/>
                           <m:ctrlPr>
-                            <a:rPr lang="ko-KR" altLang="ko-KR" sz="1600" i="1" smtClean="0"/>
+                            <a:rPr lang="ko-KR" altLang="ko-KR" sz="1600" i="1" smtClean="0">
+                              <a:latin typeface="Cambria Math"/>
+                            </a:rPr>
                           </m:ctrlPr>
                         </m:naryPr>
                         <m:sub>
@@ -9371,7 +9477,9 @@
                             <m:t>𝑖</m:t>
                           </m:r>
                           <m:r>
-                            <a:rPr lang="en-US" altLang="ko-KR" sz="1600" i="1"/>
+                            <a:rPr lang="en-US" altLang="ko-KR" sz="1600" i="1">
+                              <a:latin typeface="Cambria Math"/>
+                            </a:rPr>
                             <m:t>=0</m:t>
                           </m:r>
                         </m:sub>
@@ -9387,7 +9495,9 @@
                           <m:sSubSup>
                             <m:sSubSupPr>
                               <m:ctrlPr>
-                                <a:rPr lang="ko-KR" altLang="ko-KR" sz="1600" i="1"/>
+                                <a:rPr lang="ko-KR" altLang="ko-KR" sz="1600" i="1">
+                                  <a:latin typeface="Cambria Math"/>
+                                </a:rPr>
                               </m:ctrlPr>
                             </m:sSubSupPr>
                             <m:e>
@@ -9411,18 +9521,24 @@
                         </m:e>
                       </m:nary>
                       <m:r>
-                        <a:rPr lang="en-US" altLang="ko-KR" sz="1600" i="1"/>
+                        <a:rPr lang="en-US" altLang="ko-KR" sz="1600" i="1">
+                          <a:latin typeface="Cambria Math"/>
+                        </a:rPr>
                         <m:t>∗</m:t>
                       </m:r>
                       <m:sSubSup>
                         <m:sSubSupPr>
                           <m:ctrlPr>
-                            <a:rPr lang="ko-KR" altLang="ko-KR" sz="1600" i="1"/>
+                            <a:rPr lang="ko-KR" altLang="ko-KR" sz="1600" i="1">
+                              <a:latin typeface="Cambria Math"/>
+                            </a:rPr>
                           </m:ctrlPr>
                         </m:sSubSupPr>
                         <m:e>
                           <m:r>
-                            <a:rPr lang="en-US" altLang="ko-KR" sz="1600" i="1"/>
+                            <a:rPr lang="en-US" altLang="ko-KR" sz="1600" i="1">
+                              <a:latin typeface="Cambria Math"/>
+                            </a:rPr>
                             <m:t>𝑊</m:t>
                           </m:r>
                         </m:e>
@@ -9434,7 +9550,9 @@
                             <m:t>𝑖</m:t>
                           </m:r>
                           <m:r>
-                            <a:rPr lang="en-US" altLang="ko-KR" sz="1600" i="1"/>
+                            <a:rPr lang="en-US" altLang="ko-KR" sz="1600" i="1">
+                              <a:latin typeface="Cambria Math"/>
+                            </a:rPr>
                             <m:t>𝑗</m:t>
                           </m:r>
                         </m:sub>
@@ -9443,7 +9561,7 @@
                             <a:rPr lang="en-US" altLang="ko-KR" sz="1600" b="0" i="1" smtClean="0">
                               <a:latin typeface="Cambria Math"/>
                             </a:rPr>
-                            <m:t>1</m:t>
+                            <m:t>0</m:t>
                           </m:r>
                         </m:sup>
                       </m:sSubSup>
@@ -9482,10 +9600,10 @@
                         </m:sub>
                         <m:sup>
                           <m:r>
-                            <a:rPr lang="en-US" altLang="ko-KR" sz="1600" i="1">
-                              <a:latin typeface="Cambria Math"/>
-                            </a:rPr>
-                            <m:t>1</m:t>
+                            <a:rPr lang="en-US" altLang="ko-KR" sz="1600" b="0" i="1" smtClean="0">
+                              <a:latin typeface="Cambria Math"/>
+                            </a:rPr>
+                            <m:t>0</m:t>
                           </m:r>
                         </m:sup>
                       </m:sSubSup>
@@ -9547,7 +9665,7 @@
             <p:spPr>
               <a:xfrm>
                 <a:off x="1207907" y="5048486"/>
-                <a:ext cx="1233864" cy="343043"/>
+                <a:ext cx="1233863" cy="344966"/>
               </a:xfrm>
               <a:prstGeom prst="rect">
                 <a:avLst/>
@@ -9560,6 +9678,7 @@
               </a:bodyPr>
               <a:lstStyle/>
               <a:p>
+                <a:pPr/>
                 <a14:m>
                   <m:oMathPara xmlns:m="http://schemas.openxmlformats.org/officeDocument/2006/math">
                     <m:oMathParaPr>
@@ -9595,10 +9714,10 @@
                         </m:sub>
                         <m:sup>
                           <m:r>
-                            <a:rPr lang="en-US" altLang="ko-KR" sz="1600" i="1">
-                              <a:latin typeface="Cambria Math"/>
-                            </a:rPr>
-                            <m:t>1</m:t>
+                            <a:rPr lang="en-US" altLang="ko-KR" sz="1600" b="0" i="1" smtClean="0">
+                              <a:latin typeface="Cambria Math"/>
+                            </a:rPr>
+                            <m:t>0</m:t>
                           </m:r>
                         </m:sup>
                       </m:sSubSup>
@@ -9611,7 +9730,9 @@
                       <m:sSubSup>
                         <m:sSubSupPr>
                           <m:ctrlPr>
-                            <a:rPr lang="ko-KR" altLang="ko-KR" sz="1600" i="1" smtClean="0"/>
+                            <a:rPr lang="ko-KR" altLang="ko-KR" sz="1600" i="1" smtClean="0">
+                              <a:latin typeface="Cambria Math"/>
+                            </a:rPr>
                           </m:ctrlPr>
                         </m:sSubSupPr>
                         <m:e>
@@ -9638,7 +9759,7 @@
                             <a:rPr lang="en-US" altLang="ko-KR" sz="1600" b="0" i="1" smtClean="0">
                               <a:latin typeface="Cambria Math"/>
                             </a:rPr>
-                            <m:t>1</m:t>
+                            <m:t>0</m:t>
                           </m:r>
                         </m:sup>
                       </m:sSubSup>
@@ -9662,7 +9783,7 @@
             <p:spPr>
               <a:xfrm>
                 <a:off x="1207907" y="5048486"/>
-                <a:ext cx="1233864" cy="343043"/>
+                <a:ext cx="1233863" cy="344966"/>
               </a:xfrm>
               <a:prstGeom prst="rect">
                 <a:avLst/>
@@ -9689,8 +9810,8 @@
           </p:sp>
         </mc:Fallback>
       </mc:AlternateContent>
-      <mc:AlternateContent xmlns:mc="http://schemas.openxmlformats.org/markup-compatibility/2006">
-        <mc:Choice xmlns:a14="http://schemas.microsoft.com/office/drawing/2010/main" Requires="a14">
+      <mc:AlternateContent xmlns:mc="http://schemas.openxmlformats.org/markup-compatibility/2006" xmlns:a14="http://schemas.microsoft.com/office/drawing/2010/main">
+        <mc:Choice Requires="a14">
           <p:sp>
             <p:nvSpPr>
               <p:cNvPr id="224" name="TextBox 223"/>
@@ -9713,6 +9834,7 @@
               </a:bodyPr>
               <a:lstStyle/>
               <a:p>
+                <a:pPr/>
                 <a14:m>
                   <m:oMathPara xmlns:m="http://schemas.openxmlformats.org/officeDocument/2006/math">
                     <m:oMathParaPr>
@@ -9758,7 +9880,7 @@
             </p:txBody>
           </p:sp>
         </mc:Choice>
-        <mc:Fallback>
+        <mc:Fallback xmlns="">
           <p:sp>
             <p:nvSpPr>
               <p:cNvPr id="224" name="TextBox 223"/>
@@ -9820,6 +9942,7 @@
               </a:bodyPr>
               <a:lstStyle/>
               <a:p>
+                <a:pPr/>
                 <a14:m>
                   <m:oMathPara xmlns:m="http://schemas.openxmlformats.org/officeDocument/2006/math">
                     <m:oMathParaPr>
@@ -9831,7 +9954,9 @@
                           <m:chr m:val="∑"/>
                           <m:limLoc m:val="undOvr"/>
                           <m:ctrlPr>
-                            <a:rPr lang="ko-KR" altLang="ko-KR" sz="1600" i="1" smtClean="0"/>
+                            <a:rPr lang="ko-KR" altLang="ko-KR" sz="1600" i="1" smtClean="0">
+                              <a:latin typeface="Cambria Math"/>
+                            </a:rPr>
                           </m:ctrlPr>
                         </m:naryPr>
                         <m:sub>
@@ -9845,7 +9970,9 @@
                             <m:t>𝑗</m:t>
                           </m:r>
                           <m:r>
-                            <a:rPr lang="en-US" altLang="ko-KR" sz="1600" i="1"/>
+                            <a:rPr lang="en-US" altLang="ko-KR" sz="1600" i="1">
+                              <a:latin typeface="Cambria Math"/>
+                            </a:rPr>
                             <m:t>=0</m:t>
                           </m:r>
                         </m:sub>
@@ -9887,28 +10014,34 @@
                             </m:sub>
                             <m:sup>
                               <m:r>
-                                <a:rPr lang="en-US" altLang="ko-KR" sz="1600" i="1">
+                                <a:rPr lang="en-US" altLang="ko-KR" sz="1600" b="0" i="1" smtClean="0">
                                   <a:latin typeface="Cambria Math"/>
                                 </a:rPr>
-                                <m:t>1</m:t>
+                                <m:t>0</m:t>
                               </m:r>
                             </m:sup>
                           </m:sSubSup>
                         </m:e>
                       </m:nary>
                       <m:r>
-                        <a:rPr lang="en-US" altLang="ko-KR" sz="1600" i="1"/>
+                        <a:rPr lang="en-US" altLang="ko-KR" sz="1600" i="1">
+                          <a:latin typeface="Cambria Math"/>
+                        </a:rPr>
                         <m:t>∗</m:t>
                       </m:r>
                       <m:sSubSup>
                         <m:sSubSupPr>
                           <m:ctrlPr>
-                            <a:rPr lang="ko-KR" altLang="ko-KR" sz="1600" i="1"/>
+                            <a:rPr lang="ko-KR" altLang="ko-KR" sz="1600" i="1">
+                              <a:latin typeface="Cambria Math"/>
+                            </a:rPr>
                           </m:ctrlPr>
                         </m:sSubSupPr>
                         <m:e>
                           <m:r>
-                            <a:rPr lang="en-US" altLang="ko-KR" sz="1600" i="1"/>
+                            <a:rPr lang="en-US" altLang="ko-KR" sz="1600" i="1">
+                              <a:latin typeface="Cambria Math"/>
+                            </a:rPr>
                             <m:t>𝑊</m:t>
                           </m:r>
                         </m:e>
@@ -9925,7 +10058,7 @@
                             <a:rPr lang="en-US" altLang="ko-KR" sz="1600" b="0" i="1" smtClean="0">
                               <a:latin typeface="Cambria Math"/>
                             </a:rPr>
-                            <m:t>2</m:t>
+                            <m:t>1</m:t>
                           </m:r>
                         </m:sup>
                       </m:sSubSup>
@@ -9964,10 +10097,10 @@
                         </m:sub>
                         <m:sup>
                           <m:r>
-                            <a:rPr lang="en-US" altLang="ko-KR" sz="1600" i="1">
-                              <a:latin typeface="Cambria Math"/>
-                            </a:rPr>
-                            <m:t>2</m:t>
+                            <a:rPr lang="en-US" altLang="ko-KR" sz="1600" b="0" i="1" smtClean="0">
+                              <a:latin typeface="Cambria Math"/>
+                            </a:rPr>
+                            <m:t>1</m:t>
                           </m:r>
                         </m:sup>
                       </m:sSubSup>
@@ -10029,7 +10162,7 @@
             <p:spPr>
               <a:xfrm>
                 <a:off x="3923928" y="5013176"/>
-                <a:ext cx="1147301" cy="343427"/>
+                <a:ext cx="1147302" cy="343427"/>
               </a:xfrm>
               <a:prstGeom prst="rect">
                 <a:avLst/>
@@ -10042,6 +10175,7 @@
               </a:bodyPr>
               <a:lstStyle/>
               <a:p>
+                <a:pPr/>
                 <a14:m>
                   <m:oMathPara xmlns:m="http://schemas.openxmlformats.org/officeDocument/2006/math">
                     <m:oMathParaPr>
@@ -10080,7 +10214,7 @@
                             <a:rPr lang="en-US" altLang="ko-KR" sz="1600" b="0" i="1" smtClean="0">
                               <a:latin typeface="Cambria Math"/>
                             </a:rPr>
-                            <m:t>2</m:t>
+                            <m:t>1</m:t>
                           </m:r>
                         </m:sup>
                       </m:sSubSup>
@@ -10093,7 +10227,9 @@
                       <m:sSubSup>
                         <m:sSubSupPr>
                           <m:ctrlPr>
-                            <a:rPr lang="ko-KR" altLang="ko-KR" sz="1600" i="1" smtClean="0"/>
+                            <a:rPr lang="ko-KR" altLang="ko-KR" sz="1600" i="1" smtClean="0">
+                              <a:latin typeface="Cambria Math"/>
+                            </a:rPr>
                           </m:ctrlPr>
                         </m:sSubSupPr>
                         <m:e>
@@ -10120,7 +10256,7 @@
                             <a:rPr lang="en-US" altLang="ko-KR" sz="1600" b="0" i="1" smtClean="0">
                               <a:latin typeface="Cambria Math"/>
                             </a:rPr>
-                            <m:t>2</m:t>
+                            <m:t>1</m:t>
                           </m:r>
                         </m:sup>
                       </m:sSubSup>
@@ -10144,7 +10280,7 @@
             <p:spPr>
               <a:xfrm>
                 <a:off x="3923928" y="5013176"/>
-                <a:ext cx="1147301" cy="343427"/>
+                <a:ext cx="1147302" cy="343427"/>
               </a:xfrm>
               <a:prstGeom prst="rect">
                 <a:avLst/>
@@ -10195,6 +10331,7 @@
               </a:bodyPr>
               <a:lstStyle/>
               <a:p>
+                <a:pPr/>
                 <a14:m>
                   <m:oMathPara xmlns:m="http://schemas.openxmlformats.org/officeDocument/2006/math">
                     <m:oMathParaPr>
@@ -10236,10 +10373,10 @@
                         </m:sub>
                         <m:sup>
                           <m:r>
-                            <a:rPr lang="en-US" altLang="ko-KR" sz="1600" i="1">
-                              <a:latin typeface="Cambria Math"/>
-                            </a:rPr>
-                            <m:t>1</m:t>
+                            <a:rPr lang="en-US" altLang="ko-KR" sz="1600" b="0" i="1" smtClean="0">
+                              <a:latin typeface="Cambria Math"/>
+                            </a:rPr>
+                            <m:t>0</m:t>
                           </m:r>
                         </m:sup>
                       </m:sSubSup>
@@ -10343,7 +10480,7 @@
             <p:spPr>
               <a:xfrm>
                 <a:off x="5145174" y="4824927"/>
-                <a:ext cx="1284647" cy="645946"/>
+                <a:ext cx="1335622" cy="648063"/>
               </a:xfrm>
               <a:prstGeom prst="rect">
                 <a:avLst/>
@@ -10360,19 +10497,25 @@
                     <m:f>
                       <m:fPr>
                         <m:ctrlPr>
-                          <a:rPr lang="ko-KR" altLang="ko-KR" sz="1600" i="1" smtClean="0"/>
+                          <a:rPr lang="ko-KR" altLang="ko-KR" sz="1600" i="1" smtClean="0">
+                            <a:latin typeface="Cambria Math"/>
+                          </a:rPr>
                         </m:ctrlPr>
                       </m:fPr>
                       <m:num>
                         <m:sSup>
                           <m:sSupPr>
                             <m:ctrlPr>
-                              <a:rPr lang="ko-KR" altLang="ko-KR" sz="1600" i="1"/>
+                              <a:rPr lang="ko-KR" altLang="ko-KR" sz="1600" i="1">
+                                <a:latin typeface="Cambria Math"/>
+                              </a:rPr>
                             </m:ctrlPr>
                           </m:sSupPr>
                           <m:e>
                             <m:r>
-                              <a:rPr lang="en-US" altLang="ko-KR" sz="1600" i="1"/>
+                              <a:rPr lang="en-US" altLang="ko-KR" sz="1600" i="1">
+                                <a:latin typeface="Cambria Math"/>
+                              </a:rPr>
                               <m:t>𝑒</m:t>
                             </m:r>
                           </m:e>
@@ -10380,18 +10523,24 @@
                             <m:sSubSup>
                               <m:sSubSupPr>
                                 <m:ctrlPr>
-                                  <a:rPr lang="ko-KR" altLang="ko-KR" sz="1600" i="1"/>
+                                  <a:rPr lang="ko-KR" altLang="ko-KR" sz="1600" i="1">
+                                    <a:latin typeface="Cambria Math"/>
+                                  </a:rPr>
                                 </m:ctrlPr>
                               </m:sSubSupPr>
                               <m:e>
                                 <m:r>
-                                  <a:rPr lang="en-US" altLang="ko-KR" sz="1600" i="1"/>
+                                  <a:rPr lang="en-US" altLang="ko-KR" sz="1600" i="1">
+                                    <a:latin typeface="Cambria Math"/>
+                                  </a:rPr>
                                   <m:t>𝑍</m:t>
                                 </m:r>
                               </m:e>
                               <m:sub>
                                 <m:r>
-                                  <a:rPr lang="en-US" altLang="ko-KR" sz="1600" i="1"/>
+                                  <a:rPr lang="en-US" altLang="ko-KR" sz="1600" i="1">
+                                    <a:latin typeface="Cambria Math"/>
+                                  </a:rPr>
                                   <m:t>𝑘</m:t>
                                 </m:r>
                               </m:sub>
@@ -10400,7 +10549,7 @@
                                   <a:rPr lang="en-US" altLang="ko-KR" sz="1600" b="0" i="1" smtClean="0">
                                     <a:latin typeface="Cambria Math"/>
                                   </a:rPr>
-                                  <m:t>2</m:t>
+                                  <m:t>1</m:t>
                                 </m:r>
                               </m:sup>
                             </m:sSubSup>
@@ -10413,22 +10562,30 @@
                             <m:chr m:val="∑"/>
                             <m:limLoc m:val="undOvr"/>
                             <m:ctrlPr>
-                              <a:rPr lang="ko-KR" altLang="ko-KR" sz="1600" i="1"/>
+                              <a:rPr lang="ko-KR" altLang="ko-KR" sz="1600" i="1">
+                                <a:latin typeface="Cambria Math"/>
+                              </a:rPr>
                             </m:ctrlPr>
                           </m:naryPr>
                           <m:sub>
                             <m:r>
-                              <a:rPr lang="en-US" altLang="ko-KR" sz="1600" i="1"/>
+                              <a:rPr lang="en-US" altLang="ko-KR" sz="1600" i="1">
+                                <a:latin typeface="Cambria Math"/>
+                              </a:rPr>
                               <m:t>𝑘</m:t>
                             </m:r>
                             <m:r>
-                              <a:rPr lang="en-US" altLang="ko-KR" sz="1600" i="1"/>
+                              <a:rPr lang="en-US" altLang="ko-KR" sz="1600" i="1">
+                                <a:latin typeface="Cambria Math"/>
+                              </a:rPr>
                               <m:t>=0</m:t>
                             </m:r>
                           </m:sub>
                           <m:sup>
                             <m:r>
-                              <a:rPr lang="en-US" altLang="ko-KR" sz="1600" i="1"/>
+                              <a:rPr lang="en-US" altLang="ko-KR" sz="1600" i="1">
+                                <a:latin typeface="Cambria Math"/>
+                              </a:rPr>
                               <m:t>9</m:t>
                             </m:r>
                           </m:sup>
@@ -10436,12 +10593,16 @@
                             <m:sSup>
                               <m:sSupPr>
                                 <m:ctrlPr>
-                                  <a:rPr lang="ko-KR" altLang="ko-KR" sz="1600" i="1"/>
+                                  <a:rPr lang="ko-KR" altLang="ko-KR" sz="1600" i="1">
+                                    <a:latin typeface="Cambria Math"/>
+                                  </a:rPr>
                                 </m:ctrlPr>
                               </m:sSupPr>
                               <m:e>
                                 <m:r>
-                                  <a:rPr lang="en-US" altLang="ko-KR" sz="1600" i="1"/>
+                                  <a:rPr lang="en-US" altLang="ko-KR" sz="1600" i="1">
+                                    <a:latin typeface="Cambria Math"/>
+                                  </a:rPr>
                                   <m:t>𝑒</m:t>
                                 </m:r>
                               </m:e>
@@ -10449,18 +10610,24 @@
                                 <m:sSubSup>
                                   <m:sSubSupPr>
                                     <m:ctrlPr>
-                                      <a:rPr lang="ko-KR" altLang="ko-KR" sz="1600" i="1"/>
+                                      <a:rPr lang="ko-KR" altLang="ko-KR" sz="1600" i="1">
+                                        <a:latin typeface="Cambria Math"/>
+                                      </a:rPr>
                                     </m:ctrlPr>
                                   </m:sSubSupPr>
                                   <m:e>
                                     <m:r>
-                                      <a:rPr lang="en-US" altLang="ko-KR" sz="1600" i="1"/>
+                                      <a:rPr lang="en-US" altLang="ko-KR" sz="1600" i="1">
+                                        <a:latin typeface="Cambria Math"/>
+                                      </a:rPr>
                                       <m:t>𝑍</m:t>
                                     </m:r>
                                   </m:e>
                                   <m:sub>
                                     <m:r>
-                                      <a:rPr lang="en-US" altLang="ko-KR" sz="1600" i="1"/>
+                                      <a:rPr lang="en-US" altLang="ko-KR" sz="1600" i="1">
+                                        <a:latin typeface="Cambria Math"/>
+                                      </a:rPr>
                                       <m:t>𝑘</m:t>
                                     </m:r>
                                   </m:sub>
@@ -10469,7 +10636,7 @@
                                       <a:rPr lang="en-US" altLang="ko-KR" sz="1600" b="0" i="1" smtClean="0">
                                         <a:latin typeface="Cambria Math"/>
                                       </a:rPr>
-                                      <m:t>2</m:t>
+                                      <m:t>1</m:t>
                                     </m:r>
                                   </m:sup>
                                 </m:sSubSup>
@@ -10540,7 +10707,7 @@
             <p:spPr>
               <a:xfrm>
                 <a:off x="5145174" y="4824927"/>
-                <a:ext cx="1284647" cy="645946"/>
+                <a:ext cx="1335622" cy="648063"/>
               </a:xfrm>
               <a:prstGeom prst="rect">
                 <a:avLst/>
@@ -10567,8 +10734,8 @@
           </p:sp>
         </mc:Fallback>
       </mc:AlternateContent>
-      <mc:AlternateContent xmlns:mc="http://schemas.openxmlformats.org/markup-compatibility/2006">
-        <mc:Choice xmlns:a14="http://schemas.microsoft.com/office/drawing/2010/main" Requires="a14">
+      <mc:AlternateContent xmlns:mc="http://schemas.openxmlformats.org/markup-compatibility/2006" xmlns:a14="http://schemas.microsoft.com/office/drawing/2010/main">
+        <mc:Choice Requires="a14">
           <p:sp>
             <p:nvSpPr>
               <p:cNvPr id="235" name="직사각형 234"/>
@@ -10590,6 +10757,7 @@
               </a:bodyPr>
               <a:lstStyle/>
               <a:p>
+                <a:pPr/>
                 <a14:m>
                   <m:oMathPara xmlns:m="http://schemas.openxmlformats.org/officeDocument/2006/math">
                     <m:oMathParaPr>
@@ -10600,22 +10768,30 @@
                         <m:naryPr>
                           <m:chr m:val="∑"/>
                           <m:ctrlPr>
-                            <a:rPr lang="ko-KR" altLang="ko-KR" sz="1600" i="1" smtClean="0"/>
+                            <a:rPr lang="ko-KR" altLang="ko-KR" sz="1600" i="1" smtClean="0">
+                              <a:latin typeface="Cambria Math"/>
+                            </a:rPr>
                           </m:ctrlPr>
                         </m:naryPr>
                         <m:sub>
                           <m:r>
-                            <a:rPr lang="en-US" altLang="ko-KR" sz="1600" i="1"/>
+                            <a:rPr lang="en-US" altLang="ko-KR" sz="1600" i="1">
+                              <a:latin typeface="Cambria Math"/>
+                            </a:rPr>
                             <m:t>𝑘</m:t>
                           </m:r>
                           <m:r>
-                            <a:rPr lang="en-US" altLang="ko-KR" sz="1600" i="1"/>
+                            <a:rPr lang="en-US" altLang="ko-KR" sz="1600" i="1">
+                              <a:latin typeface="Cambria Math"/>
+                            </a:rPr>
                             <m:t>=0</m:t>
                           </m:r>
                         </m:sub>
                         <m:sup>
                           <m:r>
-                            <a:rPr lang="en-US" altLang="ko-KR" sz="1600" i="1"/>
+                            <a:rPr lang="en-US" altLang="ko-KR" sz="1600" i="1">
+                              <a:latin typeface="Cambria Math"/>
+                            </a:rPr>
                             <m:t>9</m:t>
                           </m:r>
                         </m:sup>
@@ -10623,62 +10799,84 @@
                           <m:sSub>
                             <m:sSubPr>
                               <m:ctrlPr>
-                                <a:rPr lang="ko-KR" altLang="ko-KR" sz="1600" i="1"/>
+                                <a:rPr lang="ko-KR" altLang="ko-KR" sz="1600" i="1">
+                                  <a:latin typeface="Cambria Math"/>
+                                </a:rPr>
                               </m:ctrlPr>
                             </m:sSubPr>
                             <m:e>
                               <m:r>
-                                <a:rPr lang="en-US" altLang="ko-KR" sz="1600" i="1"/>
+                                <a:rPr lang="en-US" altLang="ko-KR" sz="1600" i="1">
+                                  <a:latin typeface="Cambria Math"/>
+                                </a:rPr>
                                 <m:t>−</m:t>
                               </m:r>
                               <m:r>
-                                <a:rPr lang="en-US" altLang="ko-KR" sz="1600" i="1"/>
+                                <a:rPr lang="en-US" altLang="ko-KR" sz="1600" i="1">
+                                  <a:latin typeface="Cambria Math"/>
+                                </a:rPr>
                                 <m:t>𝑦</m:t>
                               </m:r>
                             </m:e>
                             <m:sub>
                               <m:r>
-                                <a:rPr lang="en-US" altLang="ko-KR" sz="1600" i="1"/>
+                                <a:rPr lang="en-US" altLang="ko-KR" sz="1600" i="1">
+                                  <a:latin typeface="Cambria Math"/>
+                                </a:rPr>
                                 <m:t>𝑘</m:t>
                               </m:r>
                             </m:sub>
                           </m:sSub>
                           <m:r>
-                            <a:rPr lang="en-US" altLang="ko-KR" sz="1600" i="1"/>
+                            <a:rPr lang="en-US" altLang="ko-KR" sz="1600" i="1">
+                              <a:latin typeface="Cambria Math"/>
+                            </a:rPr>
                             <m:t>∗</m:t>
                           </m:r>
                           <m:r>
                             <m:rPr>
                               <m:sty m:val="p"/>
                             </m:rPr>
-                            <a:rPr lang="en-US" altLang="ko-KR" sz="1600"/>
+                            <a:rPr lang="en-US" altLang="ko-KR" sz="1600">
+                              <a:latin typeface="Cambria Math"/>
+                            </a:rPr>
                             <m:t>log</m:t>
                           </m:r>
                           <m:r>
-                            <a:rPr lang="en-US" altLang="ko-KR" sz="1600" i="1"/>
+                            <a:rPr lang="en-US" altLang="ko-KR" sz="1600" i="1">
+                              <a:latin typeface="Cambria Math"/>
+                            </a:rPr>
                             <m:t>(</m:t>
                           </m:r>
                           <m:sSub>
                             <m:sSubPr>
                               <m:ctrlPr>
-                                <a:rPr lang="ko-KR" altLang="ko-KR" sz="1600" i="1"/>
+                                <a:rPr lang="ko-KR" altLang="ko-KR" sz="1600" i="1">
+                                  <a:latin typeface="Cambria Math"/>
+                                </a:rPr>
                               </m:ctrlPr>
                             </m:sSubPr>
                             <m:e>
                               <m:r>
-                                <a:rPr lang="en-US" altLang="ko-KR" sz="1600" i="1"/>
+                                <a:rPr lang="en-US" altLang="ko-KR" sz="1600" i="1">
+                                  <a:latin typeface="Cambria Math"/>
+                                </a:rPr>
                                 <m:t>𝑝</m:t>
                               </m:r>
                             </m:e>
                             <m:sub>
                               <m:r>
-                                <a:rPr lang="en-US" altLang="ko-KR" sz="1600" i="1"/>
+                                <a:rPr lang="en-US" altLang="ko-KR" sz="1600" i="1">
+                                  <a:latin typeface="Cambria Math"/>
+                                </a:rPr>
                                 <m:t>𝑘</m:t>
                               </m:r>
                             </m:sub>
                           </m:sSub>
                           <m:r>
-                            <a:rPr lang="en-US" altLang="ko-KR" sz="1600" i="1"/>
+                            <a:rPr lang="en-US" altLang="ko-KR" sz="1600" i="1">
+                              <a:latin typeface="Cambria Math"/>
+                            </a:rPr>
                             <m:t>)</m:t>
                           </m:r>
                         </m:e>
@@ -10776,7 +10974,7 @@
             </p:txBody>
           </p:sp>
         </mc:Choice>
-        <mc:Fallback>
+        <mc:Fallback xmlns="">
           <p:sp>
             <p:nvSpPr>
               <p:cNvPr id="235" name="직사각형 234"/>

</xml_diff>